<commit_message>
MB & P/S added to gnaf diag
</commit_message>
<xml_diff>
--- a/docs/diagrams.pptx
+++ b/docs/diagrams.pptx
@@ -200,7 +200,7 @@
           </a:lstStyle>
           <a:p>
             <a:fld id="{69B54289-CA05-2E4C-8921-2C4641790FC9}" type="datetimeFigureOut">
-              <a:t>5/1/18</a:t>
+              <a:t>7/1/18</a:t>
             </a:fld>
             <a:endParaRPr lang="en-US"/>
           </a:p>
@@ -594,7 +594,7 @@
           <a:lstStyle/>
           <a:p>
             <a:fld id="{D38E12F6-CCD2-6247-9D14-5CADBDEBFE61}" type="datetimeFigureOut">
-              <a:t>5/1/18</a:t>
+              <a:t>7/1/18</a:t>
             </a:fld>
             <a:endParaRPr lang="en-US"/>
           </a:p>
@@ -756,7 +756,7 @@
           <a:lstStyle/>
           <a:p>
             <a:fld id="{D38E12F6-CCD2-6247-9D14-5CADBDEBFE61}" type="datetimeFigureOut">
-              <a:t>5/1/18</a:t>
+              <a:t>7/1/18</a:t>
             </a:fld>
             <a:endParaRPr lang="en-US"/>
           </a:p>
@@ -928,7 +928,7 @@
           <a:lstStyle/>
           <a:p>
             <a:fld id="{D38E12F6-CCD2-6247-9D14-5CADBDEBFE61}" type="datetimeFigureOut">
-              <a:t>5/1/18</a:t>
+              <a:t>7/1/18</a:t>
             </a:fld>
             <a:endParaRPr lang="en-US"/>
           </a:p>
@@ -1090,7 +1090,7 @@
           <a:lstStyle/>
           <a:p>
             <a:fld id="{D38E12F6-CCD2-6247-9D14-5CADBDEBFE61}" type="datetimeFigureOut">
-              <a:t>5/1/18</a:t>
+              <a:t>7/1/18</a:t>
             </a:fld>
             <a:endParaRPr lang="en-US"/>
           </a:p>
@@ -1327,7 +1327,7 @@
           <a:lstStyle/>
           <a:p>
             <a:fld id="{D38E12F6-CCD2-6247-9D14-5CADBDEBFE61}" type="datetimeFigureOut">
-              <a:t>5/1/18</a:t>
+              <a:t>7/1/18</a:t>
             </a:fld>
             <a:endParaRPr lang="en-US"/>
           </a:p>
@@ -1550,7 +1550,7 @@
           <a:lstStyle/>
           <a:p>
             <a:fld id="{D38E12F6-CCD2-6247-9D14-5CADBDEBFE61}" type="datetimeFigureOut">
-              <a:t>5/1/18</a:t>
+              <a:t>7/1/18</a:t>
             </a:fld>
             <a:endParaRPr lang="en-US"/>
           </a:p>
@@ -1908,7 +1908,7 @@
           <a:lstStyle/>
           <a:p>
             <a:fld id="{D38E12F6-CCD2-6247-9D14-5CADBDEBFE61}" type="datetimeFigureOut">
-              <a:t>5/1/18</a:t>
+              <a:t>7/1/18</a:t>
             </a:fld>
             <a:endParaRPr lang="en-US"/>
           </a:p>
@@ -2019,7 +2019,7 @@
           <a:lstStyle/>
           <a:p>
             <a:fld id="{D38E12F6-CCD2-6247-9D14-5CADBDEBFE61}" type="datetimeFigureOut">
-              <a:t>5/1/18</a:t>
+              <a:t>7/1/18</a:t>
             </a:fld>
             <a:endParaRPr lang="en-US"/>
           </a:p>
@@ -2108,7 +2108,7 @@
           <a:lstStyle/>
           <a:p>
             <a:fld id="{D38E12F6-CCD2-6247-9D14-5CADBDEBFE61}" type="datetimeFigureOut">
-              <a:t>5/1/18</a:t>
+              <a:t>7/1/18</a:t>
             </a:fld>
             <a:endParaRPr lang="en-US"/>
           </a:p>
@@ -2377,7 +2377,7 @@
           <a:lstStyle/>
           <a:p>
             <a:fld id="{D38E12F6-CCD2-6247-9D14-5CADBDEBFE61}" type="datetimeFigureOut">
-              <a:t>5/1/18</a:t>
+              <a:t>7/1/18</a:t>
             </a:fld>
             <a:endParaRPr lang="en-US"/>
           </a:p>
@@ -2626,7 +2626,7 @@
           <a:lstStyle/>
           <a:p>
             <a:fld id="{D38E12F6-CCD2-6247-9D14-5CADBDEBFE61}" type="datetimeFigureOut">
-              <a:t>5/1/18</a:t>
+              <a:t>7/1/18</a:t>
             </a:fld>
             <a:endParaRPr lang="en-US"/>
           </a:p>
@@ -2831,7 +2831,7 @@
           </a:lstStyle>
           <a:p>
             <a:fld id="{D38E12F6-CCD2-6247-9D14-5CADBDEBFE61}" type="datetimeFigureOut">
-              <a:t>5/1/18</a:t>
+              <a:t>7/1/18</a:t>
             </a:fld>
             <a:endParaRPr lang="en-US"/>
           </a:p>
@@ -3459,13 +3459,13 @@
       </p:sp>
       <p:sp>
         <p:nvSpPr>
-          <p:cNvPr id="38" name="Rectangle 37"/>
+          <p:cNvPr id="39" name="Rectangle 38"/>
           <p:cNvSpPr/>
           <p:nvPr/>
         </p:nvSpPr>
         <p:spPr>
           <a:xfrm>
-            <a:off x="1313570" y="5026233"/>
+            <a:off x="2767391" y="3863589"/>
             <a:ext cx="1103709" cy="664369"/>
           </a:xfrm>
           <a:prstGeom prst="rect">
@@ -3510,20 +3510,20 @@
                 <a:ea typeface="Helvetica" charset="0"/>
                 <a:cs typeface="Helvetica" charset="0"/>
               </a:rPr>
-              <a:t>Address Site</a:t>
-            </a:r>
-          </a:p>
-        </p:txBody>
-      </p:sp>
-      <p:sp>
-        <p:nvSpPr>
-          <p:cNvPr id="39" name="Rectangle 38"/>
+              <a:t>Alias</a:t>
+            </a:r>
+          </a:p>
+        </p:txBody>
+      </p:sp>
+      <p:sp>
+        <p:nvSpPr>
+          <p:cNvPr id="44" name="Rectangle 43"/>
           <p:cNvSpPr/>
           <p:nvPr/>
         </p:nvSpPr>
         <p:spPr>
           <a:xfrm>
-            <a:off x="2767391" y="3863589"/>
+            <a:off x="4221210" y="2711320"/>
             <a:ext cx="1103709" cy="664369"/>
           </a:xfrm>
           <a:prstGeom prst="rect">
@@ -3568,20 +3568,20 @@
                 <a:ea typeface="Helvetica" charset="0"/>
                 <a:cs typeface="Helvetica" charset="0"/>
               </a:rPr>
-              <a:t>Alias</a:t>
-            </a:r>
-          </a:p>
-        </p:txBody>
-      </p:sp>
-      <p:sp>
-        <p:nvSpPr>
-          <p:cNvPr id="44" name="Rectangle 43"/>
+              <a:t>Street</a:t>
+            </a:r>
+          </a:p>
+        </p:txBody>
+      </p:sp>
+      <p:sp>
+        <p:nvSpPr>
+          <p:cNvPr id="47" name="Rectangle 46"/>
           <p:cNvSpPr/>
           <p:nvPr/>
         </p:nvSpPr>
         <p:spPr>
           <a:xfrm>
-            <a:off x="4221210" y="2711320"/>
+            <a:off x="2767390" y="2700944"/>
             <a:ext cx="1103709" cy="664369"/>
           </a:xfrm>
           <a:prstGeom prst="rect">
@@ -3626,20 +3626,20 @@
                 <a:ea typeface="Helvetica" charset="0"/>
                 <a:cs typeface="Helvetica" charset="0"/>
               </a:rPr>
-              <a:t>Street</a:t>
-            </a:r>
-          </a:p>
-        </p:txBody>
-      </p:sp>
-      <p:sp>
-        <p:nvSpPr>
-          <p:cNvPr id="47" name="Rectangle 46"/>
+              <a:t>Locality Alias</a:t>
+            </a:r>
+          </a:p>
+        </p:txBody>
+      </p:sp>
+      <p:sp>
+        <p:nvSpPr>
+          <p:cNvPr id="62" name="Rectangle 61"/>
           <p:cNvSpPr/>
           <p:nvPr/>
         </p:nvSpPr>
         <p:spPr>
           <a:xfrm>
-            <a:off x="2767390" y="2700944"/>
+            <a:off x="4221211" y="5026234"/>
             <a:ext cx="1103709" cy="664369"/>
           </a:xfrm>
           <a:prstGeom prst="rect">
@@ -3684,64 +3684,6 @@
                 <a:ea typeface="Helvetica" charset="0"/>
                 <a:cs typeface="Helvetica" charset="0"/>
               </a:rPr>
-              <a:t>Locality Alias</a:t>
-            </a:r>
-          </a:p>
-        </p:txBody>
-      </p:sp>
-      <p:sp>
-        <p:nvSpPr>
-          <p:cNvPr id="62" name="Rectangle 61"/>
-          <p:cNvSpPr/>
-          <p:nvPr/>
-        </p:nvSpPr>
-        <p:spPr>
-          <a:xfrm>
-            <a:off x="4221211" y="5026234"/>
-            <a:ext cx="1103709" cy="664369"/>
-          </a:xfrm>
-          <a:prstGeom prst="rect">
-            <a:avLst/>
-          </a:prstGeom>
-          <a:solidFill>
-            <a:srgbClr val="F4FFFF"/>
-          </a:solidFill>
-          <a:ln>
-            <a:solidFill>
-              <a:srgbClr val="000080"/>
-            </a:solidFill>
-          </a:ln>
-        </p:spPr>
-        <p:style>
-          <a:lnRef idx="2">
-            <a:schemeClr val="accent1">
-              <a:shade val="50000"/>
-            </a:schemeClr>
-          </a:lnRef>
-          <a:fillRef idx="1">
-            <a:schemeClr val="accent1"/>
-          </a:fillRef>
-          <a:effectRef idx="0">
-            <a:schemeClr val="accent1"/>
-          </a:effectRef>
-          <a:fontRef idx="minor">
-            <a:schemeClr val="lt1"/>
-          </a:fontRef>
-        </p:style>
-        <p:txBody>
-          <a:bodyPr rtlCol="0" anchor="ctr"/>
-          <a:lstStyle/>
-          <a:p>
-            <a:pPr algn="ctr"/>
-            <a:r>
-              <a:rPr lang="en-US" sz="1013" b="1">
-                <a:solidFill>
-                  <a:srgbClr val="005C84"/>
-                </a:solidFill>
-                <a:latin typeface="Helvetica" charset="0"/>
-                <a:ea typeface="Helvetica" charset="0"/>
-                <a:cs typeface="Helvetica" charset="0"/>
-              </a:rPr>
               <a:t>Geocode</a:t>
             </a:r>
           </a:p>
@@ -3772,48 +3714,6 @@
             </a:solidFill>
             <a:headEnd type="none"/>
             <a:tailEnd type="triangle"/>
-          </a:ln>
-        </p:spPr>
-        <p:style>
-          <a:lnRef idx="1">
-            <a:schemeClr val="accent1"/>
-          </a:lnRef>
-          <a:fillRef idx="0">
-            <a:schemeClr val="accent1"/>
-          </a:fillRef>
-          <a:effectRef idx="0">
-            <a:schemeClr val="accent1"/>
-          </a:effectRef>
-          <a:fontRef idx="minor">
-            <a:schemeClr val="tx1"/>
-          </a:fontRef>
-        </p:style>
-      </p:cxnSp>
-      <p:cxnSp>
-        <p:nvCxnSpPr>
-          <p:cNvPr id="79" name="Curved Connector 78"/>
-          <p:cNvCxnSpPr>
-            <a:stCxn id="35" idx="1"/>
-            <a:endCxn id="62" idx="2"/>
-          </p:cNvCxnSpPr>
-          <p:nvPr/>
-        </p:nvCxnSpPr>
-        <p:spPr>
-          <a:xfrm rot="10800000" flipH="1" flipV="1">
-            <a:off x="1313568" y="4208475"/>
-            <a:ext cx="3459497" cy="1482128"/>
-          </a:xfrm>
-          <a:prstGeom prst="curvedConnector4">
-            <a:avLst>
-              <a:gd name="adj1" fmla="val -14203"/>
-              <a:gd name="adj2" fmla="val 129606"/>
-            </a:avLst>
-          </a:prstGeom>
-          <a:ln>
-            <a:solidFill>
-              <a:srgbClr val="000080"/>
-            </a:solidFill>
-            <a:tailEnd type="arrow"/>
           </a:ln>
         </p:spPr>
         <p:style>
@@ -4276,13 +4176,13 @@
       </p:sp>
       <p:sp>
         <p:nvSpPr>
-          <p:cNvPr id="127" name="TextBox 126"/>
+          <p:cNvPr id="128" name="TextBox 127"/>
           <p:cNvSpPr txBox="1"/>
           <p:nvPr/>
         </p:nvSpPr>
         <p:spPr>
           <a:xfrm>
-            <a:off x="2444004" y="6045981"/>
+            <a:off x="4308996" y="4670857"/>
             <a:ext cx="928139" cy="155877"/>
           </a:xfrm>
           <a:prstGeom prst="rect">
@@ -4312,13 +4212,13 @@
       </p:sp>
       <p:sp>
         <p:nvSpPr>
-          <p:cNvPr id="128" name="TextBox 127"/>
+          <p:cNvPr id="129" name="TextBox 128"/>
           <p:cNvSpPr txBox="1"/>
           <p:nvPr/>
         </p:nvSpPr>
         <p:spPr>
-          <a:xfrm>
-            <a:off x="4308996" y="4670857"/>
+          <a:xfrm rot="5400000">
+            <a:off x="3561128" y="5335670"/>
             <a:ext cx="928139" cy="155877"/>
           </a:xfrm>
           <a:prstGeom prst="rect">
@@ -4348,14 +4248,14 @@
       </p:sp>
       <p:sp>
         <p:nvSpPr>
-          <p:cNvPr id="129" name="TextBox 128"/>
+          <p:cNvPr id="130" name="TextBox 129"/>
           <p:cNvSpPr txBox="1"/>
           <p:nvPr/>
         </p:nvSpPr>
         <p:spPr>
-          <a:xfrm rot="5400000">
-            <a:off x="3561128" y="5335670"/>
-            <a:ext cx="928139" cy="155877"/>
+          <a:xfrm rot="16200000">
+            <a:off x="1987453" y="5148033"/>
+            <a:ext cx="1258358" cy="155877"/>
           </a:xfrm>
           <a:prstGeom prst="rect">
             <a:avLst/>
@@ -4377,21 +4277,179 @@
                 <a:ea typeface="Helvetica" charset="0"/>
                 <a:cs typeface="Helvetica" charset="0"/>
               </a:rPr>
-              <a:t>has geocode [1]</a:t>
-            </a:r>
-          </a:p>
-        </p:txBody>
-      </p:sp>
-      <p:sp>
-        <p:nvSpPr>
-          <p:cNvPr id="130" name="TextBox 129"/>
+              <a:t>has address site [0..*]</a:t>
+            </a:r>
+          </a:p>
+        </p:txBody>
+      </p:sp>
+      <p:sp>
+        <p:nvSpPr>
+          <p:cNvPr id="28" name="Rectangle 27"/>
+          <p:cNvSpPr/>
+          <p:nvPr/>
+        </p:nvSpPr>
+        <p:spPr>
+          <a:xfrm>
+            <a:off x="1313567" y="6367000"/>
+            <a:ext cx="1103709" cy="664369"/>
+          </a:xfrm>
+          <a:prstGeom prst="rect">
+            <a:avLst/>
+          </a:prstGeom>
+          <a:solidFill>
+            <a:srgbClr val="F4FFFF"/>
+          </a:solidFill>
+          <a:ln>
+            <a:solidFill>
+              <a:srgbClr val="000080"/>
+            </a:solidFill>
+          </a:ln>
+        </p:spPr>
+        <p:style>
+          <a:lnRef idx="2">
+            <a:schemeClr val="accent1">
+              <a:shade val="50000"/>
+            </a:schemeClr>
+          </a:lnRef>
+          <a:fillRef idx="1">
+            <a:schemeClr val="accent1"/>
+          </a:fillRef>
+          <a:effectRef idx="0">
+            <a:schemeClr val="accent1"/>
+          </a:effectRef>
+          <a:fontRef idx="minor">
+            <a:schemeClr val="lt1"/>
+          </a:fontRef>
+        </p:style>
+        <p:txBody>
+          <a:bodyPr rtlCol="0" anchor="ctr"/>
+          <a:lstStyle/>
+          <a:p>
+            <a:pPr algn="ctr"/>
+            <a:r>
+              <a:rPr lang="en-US" sz="1013" b="1">
+                <a:solidFill>
+                  <a:srgbClr val="005C84"/>
+                </a:solidFill>
+                <a:latin typeface="Helvetica" charset="0"/>
+                <a:ea typeface="Helvetica" charset="0"/>
+                <a:cs typeface="Helvetica" charset="0"/>
+              </a:rPr>
+              <a:t>Address Secondary </a:t>
+            </a:r>
+          </a:p>
+        </p:txBody>
+      </p:sp>
+      <p:sp>
+        <p:nvSpPr>
+          <p:cNvPr id="29" name="Rectangle 28"/>
+          <p:cNvSpPr/>
+          <p:nvPr/>
+        </p:nvSpPr>
+        <p:spPr>
+          <a:xfrm>
+            <a:off x="4221210" y="6384878"/>
+            <a:ext cx="1103709" cy="664369"/>
+          </a:xfrm>
+          <a:prstGeom prst="rect">
+            <a:avLst/>
+          </a:prstGeom>
+          <a:solidFill>
+            <a:srgbClr val="F4FFFF"/>
+          </a:solidFill>
+          <a:ln>
+            <a:solidFill>
+              <a:srgbClr val="000080"/>
+            </a:solidFill>
+          </a:ln>
+        </p:spPr>
+        <p:style>
+          <a:lnRef idx="2">
+            <a:schemeClr val="accent1">
+              <a:shade val="50000"/>
+            </a:schemeClr>
+          </a:lnRef>
+          <a:fillRef idx="1">
+            <a:schemeClr val="accent1"/>
+          </a:fillRef>
+          <a:effectRef idx="0">
+            <a:schemeClr val="accent1"/>
+          </a:effectRef>
+          <a:fontRef idx="minor">
+            <a:schemeClr val="lt1"/>
+          </a:fontRef>
+        </p:style>
+        <p:txBody>
+          <a:bodyPr rtlCol="0" anchor="ctr"/>
+          <a:lstStyle/>
+          <a:p>
+            <a:pPr algn="ctr"/>
+            <a:r>
+              <a:rPr lang="en-US" sz="1013" b="1">
+                <a:solidFill>
+                  <a:srgbClr val="005C84"/>
+                </a:solidFill>
+                <a:latin typeface="Helvetica" charset="0"/>
+                <a:ea typeface="Helvetica" charset="0"/>
+                <a:cs typeface="Helvetica" charset="0"/>
+              </a:rPr>
+              <a:t>Mesh Block</a:t>
+            </a:r>
+          </a:p>
+        </p:txBody>
+      </p:sp>
+      <p:cxnSp>
+        <p:nvCxnSpPr>
+          <p:cNvPr id="30" name="Curved Connector 29"/>
+          <p:cNvCxnSpPr>
+            <a:stCxn id="37" idx="2"/>
+            <a:endCxn id="28" idx="0"/>
+          </p:cNvCxnSpPr>
+          <p:nvPr/>
+        </p:nvCxnSpPr>
+        <p:spPr>
+          <a:xfrm rot="5400000">
+            <a:off x="2254138" y="5301889"/>
+            <a:ext cx="676396" cy="1453827"/>
+          </a:xfrm>
+          <a:prstGeom prst="curvedConnector3">
+            <a:avLst>
+              <a:gd name="adj1" fmla="val 50000"/>
+            </a:avLst>
+          </a:prstGeom>
+          <a:ln>
+            <a:solidFill>
+              <a:srgbClr val="000080"/>
+            </a:solidFill>
+            <a:headEnd type="arrow"/>
+            <a:tailEnd type="arrow"/>
+          </a:ln>
+        </p:spPr>
+        <p:style>
+          <a:lnRef idx="1">
+            <a:schemeClr val="accent1"/>
+          </a:lnRef>
+          <a:fillRef idx="0">
+            <a:schemeClr val="accent1"/>
+          </a:fillRef>
+          <a:effectRef idx="0">
+            <a:schemeClr val="accent1"/>
+          </a:effectRef>
+          <a:fontRef idx="minor">
+            <a:schemeClr val="tx1"/>
+          </a:fontRef>
+        </p:style>
+      </p:cxnSp>
+      <p:sp>
+        <p:nvSpPr>
+          <p:cNvPr id="40" name="TextBox 39"/>
           <p:cNvSpPr txBox="1"/>
           <p:nvPr/>
         </p:nvSpPr>
         <p:spPr>
-          <a:xfrm rot="16200000">
-            <a:off x="2011306" y="5338864"/>
-            <a:ext cx="1258358" cy="155877"/>
+          <a:xfrm>
+            <a:off x="1272337" y="5913871"/>
+            <a:ext cx="908903" cy="311752"/>
           </a:xfrm>
           <a:prstGeom prst="rect">
             <a:avLst/>
@@ -4413,7 +4471,363 @@
                 <a:ea typeface="Helvetica" charset="0"/>
                 <a:cs typeface="Helvetica" charset="0"/>
               </a:rPr>
-              <a:t>has address site [0..*]</a:t>
+              <a:t>has address</a:t>
+            </a:r>
+            <a:br>
+              <a:rPr lang="en-US" sz="1013">
+                <a:latin typeface="Helvetica" charset="0"/>
+                <a:ea typeface="Helvetica" charset="0"/>
+                <a:cs typeface="Helvetica" charset="0"/>
+              </a:rPr>
+            </a:br>
+            <a:r>
+              <a:rPr lang="en-US" sz="1013">
+                <a:latin typeface="Helvetica" charset="0"/>
+                <a:ea typeface="Helvetica" charset="0"/>
+                <a:cs typeface="Helvetica" charset="0"/>
+              </a:rPr>
+              <a:t>secondary [0..*]</a:t>
+            </a:r>
+          </a:p>
+        </p:txBody>
+      </p:sp>
+      <p:sp>
+        <p:nvSpPr>
+          <p:cNvPr id="42" name="Rectangle 41"/>
+          <p:cNvSpPr/>
+          <p:nvPr/>
+        </p:nvSpPr>
+        <p:spPr>
+          <a:xfrm>
+            <a:off x="2767390" y="6384878"/>
+            <a:ext cx="1103709" cy="664369"/>
+          </a:xfrm>
+          <a:prstGeom prst="rect">
+            <a:avLst/>
+          </a:prstGeom>
+          <a:solidFill>
+            <a:srgbClr val="F4FFFF"/>
+          </a:solidFill>
+          <a:ln>
+            <a:solidFill>
+              <a:srgbClr val="000080"/>
+            </a:solidFill>
+          </a:ln>
+        </p:spPr>
+        <p:style>
+          <a:lnRef idx="2">
+            <a:schemeClr val="accent1">
+              <a:shade val="50000"/>
+            </a:schemeClr>
+          </a:lnRef>
+          <a:fillRef idx="1">
+            <a:schemeClr val="accent1"/>
+          </a:fillRef>
+          <a:effectRef idx="0">
+            <a:schemeClr val="accent1"/>
+          </a:effectRef>
+          <a:fontRef idx="minor">
+            <a:schemeClr val="lt1"/>
+          </a:fontRef>
+        </p:style>
+        <p:txBody>
+          <a:bodyPr rtlCol="0" anchor="ctr"/>
+          <a:lstStyle/>
+          <a:p>
+            <a:pPr algn="ctr"/>
+            <a:r>
+              <a:rPr lang="en-US" sz="1013" b="1">
+                <a:solidFill>
+                  <a:srgbClr val="005C84"/>
+                </a:solidFill>
+                <a:latin typeface="Helvetica" charset="0"/>
+                <a:ea typeface="Helvetica" charset="0"/>
+                <a:cs typeface="Helvetica" charset="0"/>
+              </a:rPr>
+              <a:t>Mesh Block Match</a:t>
+            </a:r>
+          </a:p>
+        </p:txBody>
+      </p:sp>
+      <p:cxnSp>
+        <p:nvCxnSpPr>
+          <p:cNvPr id="50" name="Straight Arrow Connector 49"/>
+          <p:cNvCxnSpPr>
+            <a:stCxn id="42" idx="3"/>
+            <a:endCxn id="29" idx="1"/>
+          </p:cNvCxnSpPr>
+          <p:nvPr/>
+        </p:nvCxnSpPr>
+        <p:spPr>
+          <a:xfrm>
+            <a:off x="3871099" y="6717063"/>
+            <a:ext cx="350111" cy="0"/>
+          </a:xfrm>
+          <a:prstGeom prst="straightConnector1">
+            <a:avLst/>
+          </a:prstGeom>
+          <a:ln>
+            <a:solidFill>
+              <a:srgbClr val="000080"/>
+            </a:solidFill>
+            <a:tailEnd type="arrow"/>
+          </a:ln>
+        </p:spPr>
+        <p:style>
+          <a:lnRef idx="1">
+            <a:schemeClr val="accent1"/>
+          </a:lnRef>
+          <a:fillRef idx="0">
+            <a:schemeClr val="accent1"/>
+          </a:fillRef>
+          <a:effectRef idx="0">
+            <a:schemeClr val="accent1"/>
+          </a:effectRef>
+          <a:fontRef idx="minor">
+            <a:schemeClr val="tx1"/>
+          </a:fontRef>
+        </p:style>
+      </p:cxnSp>
+      <p:sp>
+        <p:nvSpPr>
+          <p:cNvPr id="51" name="TextBox 50"/>
+          <p:cNvSpPr txBox="1"/>
+          <p:nvPr/>
+        </p:nvSpPr>
+        <p:spPr>
+          <a:xfrm rot="5400000">
+            <a:off x="3493918" y="6455828"/>
+            <a:ext cx="1104470" cy="155877"/>
+          </a:xfrm>
+          <a:prstGeom prst="rect">
+            <a:avLst/>
+          </a:prstGeom>
+          <a:solidFill>
+            <a:srgbClr val="F1F1F2"/>
+          </a:solidFill>
+        </p:spPr>
+        <p:txBody>
+          <a:bodyPr wrap="none" lIns="0" tIns="0" rIns="0" bIns="0" rtlCol="0">
+            <a:spAutoFit/>
+          </a:bodyPr>
+          <a:lstStyle/>
+          <a:p>
+            <a:pPr algn="ctr"/>
+            <a:r>
+              <a:rPr lang="en-US" sz="1013">
+                <a:latin typeface="Helvetica" charset="0"/>
+                <a:ea typeface="Helvetica" charset="0"/>
+                <a:cs typeface="Helvetica" charset="0"/>
+              </a:rPr>
+              <a:t>has Mesh Block [1]</a:t>
+            </a:r>
+          </a:p>
+        </p:txBody>
+      </p:sp>
+      <p:cxnSp>
+        <p:nvCxnSpPr>
+          <p:cNvPr id="79" name="Curved Connector 78"/>
+          <p:cNvCxnSpPr>
+            <a:stCxn id="35" idx="1"/>
+            <a:endCxn id="62" idx="2"/>
+          </p:cNvCxnSpPr>
+          <p:nvPr/>
+        </p:nvCxnSpPr>
+        <p:spPr>
+          <a:xfrm rot="10800000" flipH="1" flipV="1">
+            <a:off x="1313568" y="4208475"/>
+            <a:ext cx="3459497" cy="1482128"/>
+          </a:xfrm>
+          <a:prstGeom prst="curvedConnector4">
+            <a:avLst>
+              <a:gd name="adj1" fmla="val -8687"/>
+              <a:gd name="adj2" fmla="val 119413"/>
+            </a:avLst>
+          </a:prstGeom>
+          <a:ln>
+            <a:solidFill>
+              <a:srgbClr val="000080"/>
+            </a:solidFill>
+            <a:tailEnd type="arrow"/>
+          </a:ln>
+        </p:spPr>
+        <p:style>
+          <a:lnRef idx="1">
+            <a:schemeClr val="accent1"/>
+          </a:lnRef>
+          <a:fillRef idx="0">
+            <a:schemeClr val="accent1"/>
+          </a:fillRef>
+          <a:effectRef idx="0">
+            <a:schemeClr val="accent1"/>
+          </a:effectRef>
+          <a:fontRef idx="minor">
+            <a:schemeClr val="tx1"/>
+          </a:fontRef>
+        </p:style>
+      </p:cxnSp>
+      <p:sp>
+        <p:nvSpPr>
+          <p:cNvPr id="127" name="TextBox 126"/>
+          <p:cNvSpPr txBox="1"/>
+          <p:nvPr/>
+        </p:nvSpPr>
+        <p:spPr>
+          <a:xfrm>
+            <a:off x="761711" y="4697913"/>
+            <a:ext cx="928139" cy="155877"/>
+          </a:xfrm>
+          <a:prstGeom prst="rect">
+            <a:avLst/>
+          </a:prstGeom>
+          <a:solidFill>
+            <a:srgbClr val="F1F1F2"/>
+          </a:solidFill>
+        </p:spPr>
+        <p:txBody>
+          <a:bodyPr wrap="none" lIns="0" tIns="0" rIns="0" bIns="0" rtlCol="0">
+            <a:spAutoFit/>
+          </a:bodyPr>
+          <a:lstStyle/>
+          <a:p>
+            <a:pPr algn="ctr"/>
+            <a:r>
+              <a:rPr lang="en-US" sz="1013">
+                <a:latin typeface="Helvetica" charset="0"/>
+                <a:ea typeface="Helvetica" charset="0"/>
+                <a:cs typeface="Helvetica" charset="0"/>
+              </a:rPr>
+              <a:t>has geocode [1]</a:t>
+            </a:r>
+          </a:p>
+        </p:txBody>
+      </p:sp>
+      <p:cxnSp>
+        <p:nvCxnSpPr>
+          <p:cNvPr id="53" name="Straight Arrow Connector 52"/>
+          <p:cNvCxnSpPr/>
+          <p:nvPr/>
+        </p:nvCxnSpPr>
+        <p:spPr>
+          <a:xfrm flipH="1">
+            <a:off x="3700906" y="5690604"/>
+            <a:ext cx="4" cy="694274"/>
+          </a:xfrm>
+          <a:prstGeom prst="straightConnector1">
+            <a:avLst/>
+          </a:prstGeom>
+          <a:ln>
+            <a:solidFill>
+              <a:srgbClr val="000080"/>
+            </a:solidFill>
+            <a:tailEnd type="arrow"/>
+          </a:ln>
+        </p:spPr>
+        <p:style>
+          <a:lnRef idx="1">
+            <a:schemeClr val="accent1"/>
+          </a:lnRef>
+          <a:fillRef idx="0">
+            <a:schemeClr val="accent1"/>
+          </a:fillRef>
+          <a:effectRef idx="0">
+            <a:schemeClr val="accent1"/>
+          </a:effectRef>
+          <a:fontRef idx="minor">
+            <a:schemeClr val="tx1"/>
+          </a:fontRef>
+        </p:style>
+      </p:cxnSp>
+      <p:sp>
+        <p:nvSpPr>
+          <p:cNvPr id="48" name="TextBox 47"/>
+          <p:cNvSpPr txBox="1"/>
+          <p:nvPr/>
+        </p:nvSpPr>
+        <p:spPr>
+          <a:xfrm>
+            <a:off x="2303522" y="6113024"/>
+            <a:ext cx="1622240" cy="155877"/>
+          </a:xfrm>
+          <a:prstGeom prst="rect">
+            <a:avLst/>
+          </a:prstGeom>
+          <a:solidFill>
+            <a:srgbClr val="F1F1F2"/>
+          </a:solidFill>
+        </p:spPr>
+        <p:txBody>
+          <a:bodyPr wrap="none" lIns="0" tIns="0" rIns="0" bIns="0" rtlCol="0">
+            <a:spAutoFit/>
+          </a:bodyPr>
+          <a:lstStyle/>
+          <a:p>
+            <a:pPr algn="ctr"/>
+            <a:r>
+              <a:rPr lang="en-US" sz="1013">
+                <a:latin typeface="Helvetica" charset="0"/>
+                <a:ea typeface="Helvetica" charset="0"/>
+                <a:cs typeface="Helvetica" charset="0"/>
+              </a:rPr>
+              <a:t>has Mesh Block match [0..*]</a:t>
+            </a:r>
+          </a:p>
+        </p:txBody>
+      </p:sp>
+      <p:sp>
+        <p:nvSpPr>
+          <p:cNvPr id="38" name="Rectangle 37"/>
+          <p:cNvSpPr/>
+          <p:nvPr/>
+        </p:nvSpPr>
+        <p:spPr>
+          <a:xfrm>
+            <a:off x="1313570" y="5026233"/>
+            <a:ext cx="1103709" cy="664369"/>
+          </a:xfrm>
+          <a:prstGeom prst="rect">
+            <a:avLst/>
+          </a:prstGeom>
+          <a:solidFill>
+            <a:srgbClr val="F4FFFF"/>
+          </a:solidFill>
+          <a:ln>
+            <a:solidFill>
+              <a:srgbClr val="000080"/>
+            </a:solidFill>
+          </a:ln>
+        </p:spPr>
+        <p:style>
+          <a:lnRef idx="2">
+            <a:schemeClr val="accent1">
+              <a:shade val="50000"/>
+            </a:schemeClr>
+          </a:lnRef>
+          <a:fillRef idx="1">
+            <a:schemeClr val="accent1"/>
+          </a:fillRef>
+          <a:effectRef idx="0">
+            <a:schemeClr val="accent1"/>
+          </a:effectRef>
+          <a:fontRef idx="minor">
+            <a:schemeClr val="lt1"/>
+          </a:fontRef>
+        </p:style>
+        <p:txBody>
+          <a:bodyPr rtlCol="0" anchor="ctr"/>
+          <a:lstStyle/>
+          <a:p>
+            <a:pPr algn="ctr"/>
+            <a:r>
+              <a:rPr lang="en-US" sz="1013" b="1">
+                <a:solidFill>
+                  <a:srgbClr val="005C84"/>
+                </a:solidFill>
+                <a:latin typeface="Helvetica" charset="0"/>
+                <a:ea typeface="Helvetica" charset="0"/>
+                <a:cs typeface="Helvetica" charset="0"/>
+              </a:rPr>
+              <a:t>Address Site</a:t>
             </a:r>
           </a:p>
         </p:txBody>

</xml_diff>

<commit_message>
Joe's email change 08/01
</commit_message>
<xml_diff>
--- a/docs/diagrams.pptx
+++ b/docs/diagrams.pptx
@@ -200,7 +200,7 @@
           </a:lstStyle>
           <a:p>
             <a:fld id="{69B54289-CA05-2E4C-8921-2C4641790FC9}" type="datetimeFigureOut">
-              <a:t>7/1/18</a:t>
+              <a:t>8/1/18</a:t>
             </a:fld>
             <a:endParaRPr lang="en-US"/>
           </a:p>
@@ -594,7 +594,7 @@
           <a:lstStyle/>
           <a:p>
             <a:fld id="{D38E12F6-CCD2-6247-9D14-5CADBDEBFE61}" type="datetimeFigureOut">
-              <a:t>7/1/18</a:t>
+              <a:t>8/1/18</a:t>
             </a:fld>
             <a:endParaRPr lang="en-US"/>
           </a:p>
@@ -756,7 +756,7 @@
           <a:lstStyle/>
           <a:p>
             <a:fld id="{D38E12F6-CCD2-6247-9D14-5CADBDEBFE61}" type="datetimeFigureOut">
-              <a:t>7/1/18</a:t>
+              <a:t>8/1/18</a:t>
             </a:fld>
             <a:endParaRPr lang="en-US"/>
           </a:p>
@@ -928,7 +928,7 @@
           <a:lstStyle/>
           <a:p>
             <a:fld id="{D38E12F6-CCD2-6247-9D14-5CADBDEBFE61}" type="datetimeFigureOut">
-              <a:t>7/1/18</a:t>
+              <a:t>8/1/18</a:t>
             </a:fld>
             <a:endParaRPr lang="en-US"/>
           </a:p>
@@ -1090,7 +1090,7 @@
           <a:lstStyle/>
           <a:p>
             <a:fld id="{D38E12F6-CCD2-6247-9D14-5CADBDEBFE61}" type="datetimeFigureOut">
-              <a:t>7/1/18</a:t>
+              <a:t>8/1/18</a:t>
             </a:fld>
             <a:endParaRPr lang="en-US"/>
           </a:p>
@@ -1327,7 +1327,7 @@
           <a:lstStyle/>
           <a:p>
             <a:fld id="{D38E12F6-CCD2-6247-9D14-5CADBDEBFE61}" type="datetimeFigureOut">
-              <a:t>7/1/18</a:t>
+              <a:t>8/1/18</a:t>
             </a:fld>
             <a:endParaRPr lang="en-US"/>
           </a:p>
@@ -1550,7 +1550,7 @@
           <a:lstStyle/>
           <a:p>
             <a:fld id="{D38E12F6-CCD2-6247-9D14-5CADBDEBFE61}" type="datetimeFigureOut">
-              <a:t>7/1/18</a:t>
+              <a:t>8/1/18</a:t>
             </a:fld>
             <a:endParaRPr lang="en-US"/>
           </a:p>
@@ -1908,7 +1908,7 @@
           <a:lstStyle/>
           <a:p>
             <a:fld id="{D38E12F6-CCD2-6247-9D14-5CADBDEBFE61}" type="datetimeFigureOut">
-              <a:t>7/1/18</a:t>
+              <a:t>8/1/18</a:t>
             </a:fld>
             <a:endParaRPr lang="en-US"/>
           </a:p>
@@ -2019,7 +2019,7 @@
           <a:lstStyle/>
           <a:p>
             <a:fld id="{D38E12F6-CCD2-6247-9D14-5CADBDEBFE61}" type="datetimeFigureOut">
-              <a:t>7/1/18</a:t>
+              <a:t>8/1/18</a:t>
             </a:fld>
             <a:endParaRPr lang="en-US"/>
           </a:p>
@@ -2108,7 +2108,7 @@
           <a:lstStyle/>
           <a:p>
             <a:fld id="{D38E12F6-CCD2-6247-9D14-5CADBDEBFE61}" type="datetimeFigureOut">
-              <a:t>7/1/18</a:t>
+              <a:t>8/1/18</a:t>
             </a:fld>
             <a:endParaRPr lang="en-US"/>
           </a:p>
@@ -2377,7 +2377,7 @@
           <a:lstStyle/>
           <a:p>
             <a:fld id="{D38E12F6-CCD2-6247-9D14-5CADBDEBFE61}" type="datetimeFigureOut">
-              <a:t>7/1/18</a:t>
+              <a:t>8/1/18</a:t>
             </a:fld>
             <a:endParaRPr lang="en-US"/>
           </a:p>
@@ -2626,7 +2626,7 @@
           <a:lstStyle/>
           <a:p>
             <a:fld id="{D38E12F6-CCD2-6247-9D14-5CADBDEBFE61}" type="datetimeFigureOut">
-              <a:t>7/1/18</a:t>
+              <a:t>8/1/18</a:t>
             </a:fld>
             <a:endParaRPr lang="en-US"/>
           </a:p>
@@ -2831,7 +2831,7 @@
           </a:lstStyle>
           <a:p>
             <a:fld id="{D38E12F6-CCD2-6247-9D14-5CADBDEBFE61}" type="datetimeFigureOut">
-              <a:t>7/1/18</a:t>
+              <a:t>8/1/18</a:t>
             </a:fld>
             <a:endParaRPr lang="en-US"/>
           </a:p>
@@ -3954,8 +3954,8 @@
         </p:nvSpPr>
         <p:spPr>
           <a:xfrm>
-            <a:off x="1477497" y="3594445"/>
-            <a:ext cx="775854" cy="155877"/>
+            <a:off x="1516772" y="3594445"/>
+            <a:ext cx="697307" cy="155877"/>
           </a:xfrm>
           <a:prstGeom prst="rect">
             <a:avLst/>
@@ -3977,7 +3977,7 @@
                 <a:ea typeface="Helvetica" charset="0"/>
                 <a:cs typeface="Helvetica" charset="0"/>
               </a:rPr>
-              <a:t>geo:inside [1]</a:t>
+              <a:t>hasState [1]</a:t>
             </a:r>
           </a:p>
         </p:txBody>
@@ -6342,15 +6342,14 @@
         <p:nvCxnSpPr>
           <p:cNvPr id="26" name="Straight Arrow Connector 25"/>
           <p:cNvCxnSpPr>
-            <a:stCxn id="44" idx="2"/>
             <a:endCxn id="27" idx="0"/>
           </p:cNvCxnSpPr>
           <p:nvPr/>
         </p:nvCxnSpPr>
         <p:spPr>
           <a:xfrm>
-            <a:off x="3368751" y="4020740"/>
-            <a:ext cx="673160" cy="628832"/>
+            <a:off x="3768456" y="4032175"/>
+            <a:ext cx="1146484" cy="1483538"/>
           </a:xfrm>
           <a:prstGeom prst="straightConnector1">
             <a:avLst/>
@@ -6875,7 +6874,7 @@
         </p:nvSpPr>
         <p:spPr>
           <a:xfrm>
-            <a:off x="3490056" y="4649572"/>
+            <a:off x="4363085" y="5515713"/>
             <a:ext cx="1103709" cy="664369"/>
           </a:xfrm>
           <a:prstGeom prst="rect">
@@ -6933,7 +6932,7 @@
         </p:nvSpPr>
         <p:spPr>
           <a:xfrm>
-            <a:off x="3399227" y="4063809"/>
+            <a:off x="4032420" y="4881578"/>
             <a:ext cx="688533" cy="311752"/>
           </a:xfrm>
           <a:prstGeom prst="rect">
@@ -7395,7 +7394,7 @@
         </p:nvSpPr>
         <p:spPr>
           <a:xfrm>
-            <a:off x="2144352" y="4648609"/>
+            <a:off x="1256808" y="5515713"/>
             <a:ext cx="1103709" cy="664369"/>
           </a:xfrm>
           <a:prstGeom prst="rect">
@@ -7449,15 +7448,14 @@
         <p:nvCxnSpPr>
           <p:cNvPr id="67" name="Straight Arrow Connector 66"/>
           <p:cNvCxnSpPr>
-            <a:stCxn id="44" idx="2"/>
             <a:endCxn id="66" idx="0"/>
           </p:cNvCxnSpPr>
           <p:nvPr/>
         </p:nvCxnSpPr>
         <p:spPr>
           <a:xfrm flipH="1">
-            <a:off x="2696207" y="4020740"/>
-            <a:ext cx="672544" cy="627869"/>
+            <a:off x="1808663" y="4032175"/>
+            <a:ext cx="1260875" cy="1483538"/>
           </a:xfrm>
           <a:prstGeom prst="straightConnector1">
             <a:avLst/>
@@ -7531,8 +7529,8 @@
         </p:nvCxnSpPr>
         <p:spPr>
           <a:xfrm flipV="1">
-            <a:off x="3368751" y="4020740"/>
-            <a:ext cx="0" cy="1594008"/>
+            <a:off x="3033358" y="4020740"/>
+            <a:ext cx="335393" cy="1494971"/>
           </a:xfrm>
           <a:prstGeom prst="straightConnector1">
             <a:avLst/>
@@ -7567,7 +7565,7 @@
         </p:nvSpPr>
         <p:spPr>
           <a:xfrm>
-            <a:off x="2944899" y="5399852"/>
+            <a:off x="2732777" y="4684031"/>
             <a:ext cx="822341" cy="155877"/>
           </a:xfrm>
           <a:prstGeom prst="rect">
@@ -7603,7 +7601,7 @@
         </p:nvSpPr>
         <p:spPr>
           <a:xfrm>
-            <a:off x="2816896" y="5614748"/>
+            <a:off x="2481503" y="5515711"/>
             <a:ext cx="1103709" cy="664369"/>
           </a:xfrm>
           <a:prstGeom prst="rect">
@@ -7721,6 +7719,229 @@
                 <a:cs typeface="Helvetica" charset="0"/>
               </a:rPr>
               <a:t>has locality [1]</a:t>
+            </a:r>
+          </a:p>
+        </p:txBody>
+      </p:sp>
+      <p:sp>
+        <p:nvSpPr>
+          <p:cNvPr id="38" name="Rectangle 37"/>
+          <p:cNvSpPr/>
+          <p:nvPr/>
+        </p:nvSpPr>
+        <p:spPr>
+          <a:xfrm>
+            <a:off x="3391924" y="6239151"/>
+            <a:ext cx="1103709" cy="664369"/>
+          </a:xfrm>
+          <a:prstGeom prst="rect">
+            <a:avLst/>
+          </a:prstGeom>
+          <a:solidFill>
+            <a:srgbClr val="F4FFFF"/>
+          </a:solidFill>
+          <a:ln>
+            <a:solidFill>
+              <a:srgbClr val="000080"/>
+            </a:solidFill>
+          </a:ln>
+        </p:spPr>
+        <p:style>
+          <a:lnRef idx="2">
+            <a:schemeClr val="accent1">
+              <a:shade val="50000"/>
+            </a:schemeClr>
+          </a:lnRef>
+          <a:fillRef idx="1">
+            <a:schemeClr val="accent1"/>
+          </a:fillRef>
+          <a:effectRef idx="0">
+            <a:schemeClr val="accent1"/>
+          </a:effectRef>
+          <a:fontRef idx="minor">
+            <a:schemeClr val="lt1"/>
+          </a:fontRef>
+        </p:style>
+        <p:txBody>
+          <a:bodyPr rtlCol="0" anchor="ctr"/>
+          <a:lstStyle/>
+          <a:p>
+            <a:pPr algn="ctr"/>
+            <a:r>
+              <a:rPr lang="en-US" sz="1013" b="1">
+                <a:solidFill>
+                  <a:srgbClr val="005C84"/>
+                </a:solidFill>
+                <a:latin typeface="Helvetica" charset="0"/>
+                <a:ea typeface="Helvetica" charset="0"/>
+                <a:cs typeface="Helvetica" charset="0"/>
+              </a:rPr>
+              <a:t>Address Site</a:t>
+            </a:r>
+          </a:p>
+        </p:txBody>
+      </p:sp>
+      <p:cxnSp>
+        <p:nvCxnSpPr>
+          <p:cNvPr id="53" name="Straight Arrow Connector 52"/>
+          <p:cNvCxnSpPr>
+            <a:stCxn id="38" idx="0"/>
+          </p:cNvCxnSpPr>
+          <p:nvPr/>
+        </p:nvCxnSpPr>
+        <p:spPr>
+          <a:xfrm flipH="1" flipV="1">
+            <a:off x="3572217" y="4032175"/>
+            <a:ext cx="371562" cy="2206976"/>
+          </a:xfrm>
+          <a:prstGeom prst="straightConnector1">
+            <a:avLst/>
+          </a:prstGeom>
+          <a:ln>
+            <a:solidFill>
+              <a:srgbClr val="000080"/>
+            </a:solidFill>
+            <a:tailEnd type="arrow"/>
+          </a:ln>
+        </p:spPr>
+        <p:style>
+          <a:lnRef idx="1">
+            <a:schemeClr val="accent1"/>
+          </a:lnRef>
+          <a:fillRef idx="0">
+            <a:schemeClr val="accent1"/>
+          </a:fillRef>
+          <a:effectRef idx="0">
+            <a:schemeClr val="accent1"/>
+          </a:effectRef>
+          <a:fontRef idx="minor">
+            <a:schemeClr val="tx1"/>
+          </a:fontRef>
+        </p:style>
+      </p:cxnSp>
+      <p:sp>
+        <p:nvSpPr>
+          <p:cNvPr id="39" name="TextBox 38"/>
+          <p:cNvSpPr txBox="1"/>
+          <p:nvPr/>
+        </p:nvSpPr>
+        <p:spPr>
+          <a:xfrm>
+            <a:off x="3621816" y="5569986"/>
+            <a:ext cx="710131" cy="311752"/>
+          </a:xfrm>
+          <a:prstGeom prst="rect">
+            <a:avLst/>
+          </a:prstGeom>
+          <a:solidFill>
+            <a:srgbClr val="F1F1F2"/>
+          </a:solidFill>
+        </p:spPr>
+        <p:txBody>
+          <a:bodyPr wrap="none" lIns="0" tIns="0" rIns="0" bIns="0" rtlCol="0">
+            <a:spAutoFit/>
+          </a:bodyPr>
+          <a:lstStyle/>
+          <a:p>
+            <a:pPr algn="ctr"/>
+            <a:r>
+              <a:rPr lang="en-US" sz="1013">
+                <a:latin typeface="Helvetica" charset="0"/>
+                <a:ea typeface="Helvetica" charset="0"/>
+                <a:cs typeface="Helvetica" charset="0"/>
+              </a:rPr>
+              <a:t>has address</a:t>
+            </a:r>
+            <a:br>
+              <a:rPr lang="en-US" sz="1013">
+                <a:latin typeface="Helvetica" charset="0"/>
+                <a:ea typeface="Helvetica" charset="0"/>
+                <a:cs typeface="Helvetica" charset="0"/>
+              </a:rPr>
+            </a:br>
+            <a:r>
+              <a:rPr lang="en-US" sz="1013">
+                <a:latin typeface="Helvetica" charset="0"/>
+                <a:ea typeface="Helvetica" charset="0"/>
+                <a:cs typeface="Helvetica" charset="0"/>
+              </a:rPr>
+              <a:t>site [0..*]</a:t>
+            </a:r>
+          </a:p>
+        </p:txBody>
+      </p:sp>
+      <p:cxnSp>
+        <p:nvCxnSpPr>
+          <p:cNvPr id="54" name="Curved Connector 53"/>
+          <p:cNvCxnSpPr>
+            <a:endCxn id="30" idx="2"/>
+          </p:cNvCxnSpPr>
+          <p:nvPr/>
+        </p:nvCxnSpPr>
+        <p:spPr>
+          <a:xfrm rot="5400000" flipH="1">
+            <a:off x="1989289" y="3181187"/>
+            <a:ext cx="122134" cy="1514895"/>
+          </a:xfrm>
+          <a:prstGeom prst="curvedConnector3">
+            <a:avLst>
+              <a:gd name="adj1" fmla="val -187171"/>
+            </a:avLst>
+          </a:prstGeom>
+          <a:ln>
+            <a:solidFill>
+              <a:srgbClr val="000080"/>
+            </a:solidFill>
+            <a:tailEnd type="arrow"/>
+          </a:ln>
+        </p:spPr>
+        <p:style>
+          <a:lnRef idx="1">
+            <a:schemeClr val="accent1"/>
+          </a:lnRef>
+          <a:fillRef idx="0">
+            <a:schemeClr val="accent1"/>
+          </a:fillRef>
+          <a:effectRef idx="0">
+            <a:schemeClr val="accent1"/>
+          </a:effectRef>
+          <a:fontRef idx="minor">
+            <a:schemeClr val="tx1"/>
+          </a:fontRef>
+        </p:style>
+      </p:cxnSp>
+      <p:sp>
+        <p:nvSpPr>
+          <p:cNvPr id="68" name="TextBox 67"/>
+          <p:cNvSpPr txBox="1"/>
+          <p:nvPr/>
+        </p:nvSpPr>
+        <p:spPr>
+          <a:xfrm>
+            <a:off x="1078863" y="4051612"/>
+            <a:ext cx="1025906" cy="155877"/>
+          </a:xfrm>
+          <a:prstGeom prst="rect">
+            <a:avLst/>
+          </a:prstGeom>
+          <a:solidFill>
+            <a:srgbClr val="F1F1F2"/>
+          </a:solidFill>
+        </p:spPr>
+        <p:txBody>
+          <a:bodyPr wrap="square" lIns="0" tIns="0" rIns="0" bIns="0" rtlCol="0">
+            <a:spAutoFit/>
+          </a:bodyPr>
+          <a:lstStyle/>
+          <a:p>
+            <a:pPr algn="ctr"/>
+            <a:r>
+              <a:rPr lang="en-US" sz="1013">
+                <a:latin typeface="Helvetica" charset="0"/>
+                <a:ea typeface="Helvetica" charset="0"/>
+                <a:cs typeface="Helvetica" charset="0"/>
+              </a:rPr>
+              <a:t>dct:description [1]</a:t>
             </a:r>
           </a:p>
         </p:txBody>
@@ -8898,8 +9119,8 @@
         </p:nvSpPr>
         <p:spPr>
           <a:xfrm>
-            <a:off x="4169364" y="3454740"/>
-            <a:ext cx="411971" cy="467629"/>
+            <a:off x="4118068" y="3454740"/>
+            <a:ext cx="514564" cy="311752"/>
           </a:xfrm>
           <a:prstGeom prst="rect">
             <a:avLst/>
@@ -8921,22 +9142,15 @@
                 <a:ea typeface="Helvetica" charset="0"/>
                 <a:cs typeface="Helvetica" charset="0"/>
               </a:rPr>
-              <a:t>geo:</a:t>
-            </a:r>
-            <a:br>
+              <a:t>hasState</a:t>
+            </a:r>
+            <a:r>
               <a:rPr lang="en-US" sz="1013">
                 <a:latin typeface="Helvetica" charset="0"/>
                 <a:ea typeface="Helvetica" charset="0"/>
                 <a:cs typeface="Helvetica" charset="0"/>
               </a:rPr>
-            </a:br>
-            <a:r>
-              <a:rPr lang="en-US" sz="1013">
-                <a:latin typeface="Helvetica" charset="0"/>
-                <a:ea typeface="Helvetica" charset="0"/>
-                <a:cs typeface="Helvetica" charset="0"/>
-              </a:rPr>
-              <a:t>indside</a:t>
+              <a:t/>
             </a:r>
             <a:br>
               <a:rPr lang="en-US" sz="1013">

</xml_diff>

<commit_message>
added geocode & confidence props to StreetLoc
</commit_message>
<xml_diff>
--- a/docs/diagrams.pptx
+++ b/docs/diagrams.pptx
@@ -200,7 +200,7 @@
           </a:lstStyle>
           <a:p>
             <a:fld id="{69B54289-CA05-2E4C-8921-2C4641790FC9}" type="datetimeFigureOut">
-              <a:t>8/1/18</a:t>
+              <a:t>9/1/18</a:t>
             </a:fld>
             <a:endParaRPr lang="en-US"/>
           </a:p>
@@ -594,7 +594,7 @@
           <a:lstStyle/>
           <a:p>
             <a:fld id="{D38E12F6-CCD2-6247-9D14-5CADBDEBFE61}" type="datetimeFigureOut">
-              <a:t>8/1/18</a:t>
+              <a:t>9/1/18</a:t>
             </a:fld>
             <a:endParaRPr lang="en-US"/>
           </a:p>
@@ -756,7 +756,7 @@
           <a:lstStyle/>
           <a:p>
             <a:fld id="{D38E12F6-CCD2-6247-9D14-5CADBDEBFE61}" type="datetimeFigureOut">
-              <a:t>8/1/18</a:t>
+              <a:t>9/1/18</a:t>
             </a:fld>
             <a:endParaRPr lang="en-US"/>
           </a:p>
@@ -928,7 +928,7 @@
           <a:lstStyle/>
           <a:p>
             <a:fld id="{D38E12F6-CCD2-6247-9D14-5CADBDEBFE61}" type="datetimeFigureOut">
-              <a:t>8/1/18</a:t>
+              <a:t>9/1/18</a:t>
             </a:fld>
             <a:endParaRPr lang="en-US"/>
           </a:p>
@@ -1090,7 +1090,7 @@
           <a:lstStyle/>
           <a:p>
             <a:fld id="{D38E12F6-CCD2-6247-9D14-5CADBDEBFE61}" type="datetimeFigureOut">
-              <a:t>8/1/18</a:t>
+              <a:t>9/1/18</a:t>
             </a:fld>
             <a:endParaRPr lang="en-US"/>
           </a:p>
@@ -1327,7 +1327,7 @@
           <a:lstStyle/>
           <a:p>
             <a:fld id="{D38E12F6-CCD2-6247-9D14-5CADBDEBFE61}" type="datetimeFigureOut">
-              <a:t>8/1/18</a:t>
+              <a:t>9/1/18</a:t>
             </a:fld>
             <a:endParaRPr lang="en-US"/>
           </a:p>
@@ -1550,7 +1550,7 @@
           <a:lstStyle/>
           <a:p>
             <a:fld id="{D38E12F6-CCD2-6247-9D14-5CADBDEBFE61}" type="datetimeFigureOut">
-              <a:t>8/1/18</a:t>
+              <a:t>9/1/18</a:t>
             </a:fld>
             <a:endParaRPr lang="en-US"/>
           </a:p>
@@ -1908,7 +1908,7 @@
           <a:lstStyle/>
           <a:p>
             <a:fld id="{D38E12F6-CCD2-6247-9D14-5CADBDEBFE61}" type="datetimeFigureOut">
-              <a:t>8/1/18</a:t>
+              <a:t>9/1/18</a:t>
             </a:fld>
             <a:endParaRPr lang="en-US"/>
           </a:p>
@@ -2019,7 +2019,7 @@
           <a:lstStyle/>
           <a:p>
             <a:fld id="{D38E12F6-CCD2-6247-9D14-5CADBDEBFE61}" type="datetimeFigureOut">
-              <a:t>8/1/18</a:t>
+              <a:t>9/1/18</a:t>
             </a:fld>
             <a:endParaRPr lang="en-US"/>
           </a:p>
@@ -2108,7 +2108,7 @@
           <a:lstStyle/>
           <a:p>
             <a:fld id="{D38E12F6-CCD2-6247-9D14-5CADBDEBFE61}" type="datetimeFigureOut">
-              <a:t>8/1/18</a:t>
+              <a:t>9/1/18</a:t>
             </a:fld>
             <a:endParaRPr lang="en-US"/>
           </a:p>
@@ -2377,7 +2377,7 @@
           <a:lstStyle/>
           <a:p>
             <a:fld id="{D38E12F6-CCD2-6247-9D14-5CADBDEBFE61}" type="datetimeFigureOut">
-              <a:t>8/1/18</a:t>
+              <a:t>9/1/18</a:t>
             </a:fld>
             <a:endParaRPr lang="en-US"/>
           </a:p>
@@ -2626,7 +2626,7 @@
           <a:lstStyle/>
           <a:p>
             <a:fld id="{D38E12F6-CCD2-6247-9D14-5CADBDEBFE61}" type="datetimeFigureOut">
-              <a:t>8/1/18</a:t>
+              <a:t>9/1/18</a:t>
             </a:fld>
             <a:endParaRPr lang="en-US"/>
           </a:p>
@@ -2831,7 +2831,7 @@
           </a:lstStyle>
           <a:p>
             <a:fld id="{D38E12F6-CCD2-6247-9D14-5CADBDEBFE61}" type="datetimeFigureOut">
-              <a:t>8/1/18</a:t>
+              <a:t>9/1/18</a:t>
             </a:fld>
             <a:endParaRPr lang="en-US"/>
           </a:p>
@@ -4975,7 +4975,7 @@
         </p:nvSpPr>
         <p:spPr>
           <a:xfrm>
-            <a:off x="4468719" y="2308621"/>
+            <a:off x="4753197" y="2331336"/>
             <a:ext cx="1103709" cy="664369"/>
           </a:xfrm>
           <a:prstGeom prst="rect">
@@ -5149,7 +5149,7 @@
         </p:nvSpPr>
         <p:spPr>
           <a:xfrm>
-            <a:off x="4468720" y="4279013"/>
+            <a:off x="4753197" y="4383396"/>
             <a:ext cx="1103709" cy="664369"/>
           </a:xfrm>
           <a:prstGeom prst="rect">
@@ -5210,8 +5210,8 @@
         </p:nvCxnSpPr>
         <p:spPr>
           <a:xfrm flipV="1">
-            <a:off x="3920605" y="2640806"/>
-            <a:ext cx="548114" cy="1047750"/>
+            <a:off x="3920605" y="2663521"/>
+            <a:ext cx="832592" cy="1025035"/>
           </a:xfrm>
           <a:prstGeom prst="straightConnector1">
             <a:avLst/>
@@ -5289,7 +5289,7 @@
         <p:spPr>
           <a:xfrm>
             <a:off x="3920605" y="3688556"/>
-            <a:ext cx="548115" cy="922642"/>
+            <a:ext cx="832592" cy="1027025"/>
           </a:xfrm>
           <a:prstGeom prst="straightConnector1">
             <a:avLst/>
@@ -5978,14 +5978,13 @@
           <p:cNvPr id="74" name="Straight Arrow Connector 73"/>
           <p:cNvCxnSpPr>
             <a:stCxn id="79" idx="0"/>
-            <a:endCxn id="36" idx="2"/>
           </p:cNvCxnSpPr>
           <p:nvPr/>
         </p:nvCxnSpPr>
         <p:spPr>
-          <a:xfrm flipH="1" flipV="1">
-            <a:off x="3366881" y="5318181"/>
-            <a:ext cx="1870" cy="633071"/>
+          <a:xfrm flipV="1">
+            <a:off x="1358095" y="5328396"/>
+            <a:ext cx="1455061" cy="622856"/>
           </a:xfrm>
           <a:prstGeom prst="straightConnector1">
             <a:avLst/>
@@ -6020,7 +6019,7 @@
         </p:nvSpPr>
         <p:spPr>
           <a:xfrm>
-            <a:off x="2988857" y="5536810"/>
+            <a:off x="1604176" y="5657132"/>
             <a:ext cx="822341" cy="155877"/>
           </a:xfrm>
           <a:prstGeom prst="rect">
@@ -6056,7 +6055,7 @@
         </p:nvSpPr>
         <p:spPr>
           <a:xfrm>
-            <a:off x="2816896" y="5951252"/>
+            <a:off x="806240" y="5951252"/>
             <a:ext cx="1103709" cy="664369"/>
           </a:xfrm>
           <a:prstGeom prst="rect">
@@ -6102,6 +6101,287 @@
                 <a:cs typeface="Helvetica" charset="0"/>
               </a:rPr>
               <a:t>Alias</a:t>
+            </a:r>
+          </a:p>
+        </p:txBody>
+      </p:sp>
+      <p:cxnSp>
+        <p:nvCxnSpPr>
+          <p:cNvPr id="29" name="Straight Arrow Connector 28"/>
+          <p:cNvCxnSpPr>
+            <a:stCxn id="36" idx="2"/>
+            <a:endCxn id="32" idx="0"/>
+          </p:cNvCxnSpPr>
+          <p:nvPr/>
+        </p:nvCxnSpPr>
+        <p:spPr>
+          <a:xfrm>
+            <a:off x="3366881" y="5318181"/>
+            <a:ext cx="1869" cy="637084"/>
+          </a:xfrm>
+          <a:prstGeom prst="straightConnector1">
+            <a:avLst/>
+          </a:prstGeom>
+          <a:ln>
+            <a:solidFill>
+              <a:srgbClr val="000080"/>
+            </a:solidFill>
+            <a:tailEnd type="arrow"/>
+          </a:ln>
+        </p:spPr>
+        <p:style>
+          <a:lnRef idx="1">
+            <a:schemeClr val="accent1"/>
+          </a:lnRef>
+          <a:fillRef idx="0">
+            <a:schemeClr val="accent1"/>
+          </a:fillRef>
+          <a:effectRef idx="0">
+            <a:schemeClr val="accent1"/>
+          </a:effectRef>
+          <a:fontRef idx="minor">
+            <a:schemeClr val="tx1"/>
+          </a:fontRef>
+        </p:style>
+      </p:cxnSp>
+      <p:sp>
+        <p:nvSpPr>
+          <p:cNvPr id="32" name="Rectangle 31"/>
+          <p:cNvSpPr/>
+          <p:nvPr/>
+        </p:nvSpPr>
+        <p:spPr>
+          <a:xfrm>
+            <a:off x="2816895" y="5955265"/>
+            <a:ext cx="1103709" cy="664369"/>
+          </a:xfrm>
+          <a:prstGeom prst="rect">
+            <a:avLst/>
+          </a:prstGeom>
+          <a:solidFill>
+            <a:srgbClr val="F4FFFF"/>
+          </a:solidFill>
+          <a:ln>
+            <a:solidFill>
+              <a:srgbClr val="000080"/>
+            </a:solidFill>
+          </a:ln>
+        </p:spPr>
+        <p:style>
+          <a:lnRef idx="2">
+            <a:schemeClr val="accent1">
+              <a:shade val="50000"/>
+            </a:schemeClr>
+          </a:lnRef>
+          <a:fillRef idx="1">
+            <a:schemeClr val="accent1"/>
+          </a:fillRef>
+          <a:effectRef idx="0">
+            <a:schemeClr val="accent1"/>
+          </a:effectRef>
+          <a:fontRef idx="minor">
+            <a:schemeClr val="lt1"/>
+          </a:fontRef>
+        </p:style>
+        <p:txBody>
+          <a:bodyPr rtlCol="0" anchor="ctr"/>
+          <a:lstStyle/>
+          <a:p>
+            <a:pPr algn="ctr"/>
+            <a:r>
+              <a:rPr lang="en-US" sz="1013" b="1">
+                <a:solidFill>
+                  <a:srgbClr val="005C84"/>
+                </a:solidFill>
+                <a:latin typeface="Helvetica" charset="0"/>
+                <a:ea typeface="Helvetica" charset="0"/>
+                <a:cs typeface="Helvetica" charset="0"/>
+              </a:rPr>
+              <a:t>Geocode</a:t>
+            </a:r>
+          </a:p>
+        </p:txBody>
+      </p:sp>
+      <p:sp>
+        <p:nvSpPr>
+          <p:cNvPr id="33" name="TextBox 32"/>
+          <p:cNvSpPr txBox="1"/>
+          <p:nvPr/>
+        </p:nvSpPr>
+        <p:spPr>
+          <a:xfrm>
+            <a:off x="2769481" y="5639499"/>
+            <a:ext cx="1105692" cy="155877"/>
+          </a:xfrm>
+          <a:prstGeom prst="rect">
+            <a:avLst/>
+          </a:prstGeom>
+          <a:solidFill>
+            <a:srgbClr val="F1F1F2"/>
+          </a:solidFill>
+        </p:spPr>
+        <p:txBody>
+          <a:bodyPr wrap="square" lIns="0" tIns="0" rIns="0" bIns="0" rtlCol="0">
+            <a:spAutoFit/>
+          </a:bodyPr>
+          <a:lstStyle/>
+          <a:p>
+            <a:pPr algn="ctr"/>
+            <a:r>
+              <a:rPr lang="en-US" sz="1013">
+                <a:latin typeface="Helvetica" charset="0"/>
+                <a:ea typeface="Helvetica" charset="0"/>
+                <a:cs typeface="Helvetica" charset="0"/>
+              </a:rPr>
+              <a:t>has geocode [1]</a:t>
+            </a:r>
+          </a:p>
+        </p:txBody>
+      </p:sp>
+      <p:sp>
+        <p:nvSpPr>
+          <p:cNvPr id="34" name="Rectangle 33"/>
+          <p:cNvSpPr/>
+          <p:nvPr/>
+        </p:nvSpPr>
+        <p:spPr>
+          <a:xfrm>
+            <a:off x="4753197" y="5951251"/>
+            <a:ext cx="1103709" cy="664369"/>
+          </a:xfrm>
+          <a:prstGeom prst="rect">
+            <a:avLst/>
+          </a:prstGeom>
+          <a:solidFill>
+            <a:srgbClr val="F4FFFF"/>
+          </a:solidFill>
+          <a:ln>
+            <a:solidFill>
+              <a:srgbClr val="000080"/>
+            </a:solidFill>
+          </a:ln>
+        </p:spPr>
+        <p:style>
+          <a:lnRef idx="2">
+            <a:schemeClr val="accent1">
+              <a:shade val="50000"/>
+            </a:schemeClr>
+          </a:lnRef>
+          <a:fillRef idx="1">
+            <a:schemeClr val="accent1"/>
+          </a:fillRef>
+          <a:effectRef idx="0">
+            <a:schemeClr val="accent1"/>
+          </a:effectRef>
+          <a:fontRef idx="minor">
+            <a:schemeClr val="lt1"/>
+          </a:fontRef>
+        </p:style>
+        <p:txBody>
+          <a:bodyPr rtlCol="0" anchor="ctr"/>
+          <a:lstStyle/>
+          <a:p>
+            <a:pPr algn="ctr"/>
+            <a:r>
+              <a:rPr lang="en-US" sz="1013" b="1">
+                <a:solidFill>
+                  <a:srgbClr val="005C84"/>
+                </a:solidFill>
+                <a:latin typeface="Helvetica" charset="0"/>
+                <a:ea typeface="Helvetica" charset="0"/>
+                <a:cs typeface="Helvetica" charset="0"/>
+              </a:rPr>
+              <a:t>GNAF Confidence</a:t>
+            </a:r>
+          </a:p>
+        </p:txBody>
+      </p:sp>
+      <p:cxnSp>
+        <p:nvCxnSpPr>
+          <p:cNvPr id="35" name="Straight Arrow Connector 34"/>
+          <p:cNvCxnSpPr>
+            <a:stCxn id="36" idx="3"/>
+            <a:endCxn id="34" idx="0"/>
+          </p:cNvCxnSpPr>
+          <p:nvPr/>
+        </p:nvCxnSpPr>
+        <p:spPr>
+          <a:xfrm>
+            <a:off x="3918735" y="4985997"/>
+            <a:ext cx="1386317" cy="965254"/>
+          </a:xfrm>
+          <a:prstGeom prst="straightConnector1">
+            <a:avLst/>
+          </a:prstGeom>
+          <a:ln>
+            <a:solidFill>
+              <a:srgbClr val="000080"/>
+            </a:solidFill>
+            <a:tailEnd type="arrow"/>
+          </a:ln>
+        </p:spPr>
+        <p:style>
+          <a:lnRef idx="1">
+            <a:schemeClr val="accent1"/>
+          </a:lnRef>
+          <a:fillRef idx="0">
+            <a:schemeClr val="accent1"/>
+          </a:fillRef>
+          <a:effectRef idx="0">
+            <a:schemeClr val="accent1"/>
+          </a:effectRef>
+          <a:fontRef idx="minor">
+            <a:schemeClr val="tx1"/>
+          </a:fontRef>
+        </p:style>
+      </p:cxnSp>
+      <p:sp>
+        <p:nvSpPr>
+          <p:cNvPr id="37" name="TextBox 36"/>
+          <p:cNvSpPr txBox="1"/>
+          <p:nvPr/>
+        </p:nvSpPr>
+        <p:spPr>
+          <a:xfrm>
+            <a:off x="4336901" y="5345380"/>
+            <a:ext cx="812722" cy="311752"/>
+          </a:xfrm>
+          <a:prstGeom prst="rect">
+            <a:avLst/>
+          </a:prstGeom>
+          <a:solidFill>
+            <a:srgbClr val="F1F1F2"/>
+          </a:solidFill>
+        </p:spPr>
+        <p:txBody>
+          <a:bodyPr wrap="none" lIns="0" tIns="0" rIns="0" bIns="0" rtlCol="0">
+            <a:spAutoFit/>
+          </a:bodyPr>
+          <a:lstStyle/>
+          <a:p>
+            <a:pPr algn="ctr"/>
+            <a:r>
+              <a:rPr lang="en-US" sz="1013">
+                <a:latin typeface="Helvetica" charset="0"/>
+                <a:ea typeface="Helvetica" charset="0"/>
+                <a:cs typeface="Helvetica" charset="0"/>
+              </a:rPr>
+              <a:t>has GNAF</a:t>
+            </a:r>
+            <a:br>
+              <a:rPr lang="en-US" sz="1013">
+                <a:latin typeface="Helvetica" charset="0"/>
+                <a:ea typeface="Helvetica" charset="0"/>
+                <a:cs typeface="Helvetica" charset="0"/>
+              </a:rPr>
+            </a:br>
+            <a:r>
+              <a:rPr lang="en-US" sz="1013">
+                <a:latin typeface="Helvetica" charset="0"/>
+                <a:ea typeface="Helvetica" charset="0"/>
+                <a:cs typeface="Helvetica" charset="0"/>
+              </a:rPr>
+              <a:t>confidence [1]</a:t>
             </a:r>
           </a:p>
         </p:txBody>
@@ -8973,7 +9253,8 @@
             <a:solidFill>
               <a:srgbClr val="000080"/>
             </a:solidFill>
-            <a:tailEnd type="triangle"/>
+            <a:headEnd type="none" w="med" len="med"/>
+            <a:tailEnd type="arrow" w="med" len="med"/>
           </a:ln>
         </p:spPr>
         <p:style>
@@ -9143,14 +9424,6 @@
                 <a:cs typeface="Helvetica" charset="0"/>
               </a:rPr>
               <a:t>hasState</a:t>
-            </a:r>
-            <a:r>
-              <a:rPr lang="en-US" sz="1013">
-                <a:latin typeface="Helvetica" charset="0"/>
-                <a:ea typeface="Helvetica" charset="0"/>
-                <a:cs typeface="Helvetica" charset="0"/>
-              </a:rPr>
-              <a:t/>
             </a:r>
             <a:br>
               <a:rPr lang="en-US" sz="1013">
@@ -10043,6 +10316,139 @@
                 <a:cs typeface="Helvetica" charset="0"/>
               </a:rPr>
               <a:t>geo:hasGeometry [1]</a:t>
+            </a:r>
+          </a:p>
+        </p:txBody>
+      </p:sp>
+      <p:sp>
+        <p:nvSpPr>
+          <p:cNvPr id="17" name="Rectangle 16"/>
+          <p:cNvSpPr/>
+          <p:nvPr/>
+        </p:nvSpPr>
+        <p:spPr>
+          <a:xfrm>
+            <a:off x="2816896" y="1721026"/>
+            <a:ext cx="1103709" cy="664369"/>
+          </a:xfrm>
+          <a:prstGeom prst="rect">
+            <a:avLst/>
+          </a:prstGeom>
+          <a:solidFill>
+            <a:schemeClr val="bg1"/>
+          </a:solidFill>
+          <a:ln>
+            <a:solidFill>
+              <a:srgbClr val="000080"/>
+            </a:solidFill>
+          </a:ln>
+        </p:spPr>
+        <p:style>
+          <a:lnRef idx="2">
+            <a:schemeClr val="accent1">
+              <a:shade val="50000"/>
+            </a:schemeClr>
+          </a:lnRef>
+          <a:fillRef idx="1">
+            <a:schemeClr val="accent1"/>
+          </a:fillRef>
+          <a:effectRef idx="0">
+            <a:schemeClr val="accent1"/>
+          </a:effectRef>
+          <a:fontRef idx="minor">
+            <a:schemeClr val="lt1"/>
+          </a:fontRef>
+        </p:style>
+        <p:txBody>
+          <a:bodyPr rtlCol="0" anchor="ctr"/>
+          <a:lstStyle/>
+          <a:p>
+            <a:pPr algn="ctr"/>
+            <a:r>
+              <a:rPr lang="en-US" sz="1013" b="1">
+                <a:solidFill>
+                  <a:srgbClr val="005C84"/>
+                </a:solidFill>
+                <a:latin typeface="Helvetica" charset="0"/>
+                <a:ea typeface="Helvetica" charset="0"/>
+                <a:cs typeface="Helvetica" charset="0"/>
+              </a:rPr>
+              <a:t>geo:Feature</a:t>
+            </a:r>
+          </a:p>
+        </p:txBody>
+      </p:sp>
+      <p:cxnSp>
+        <p:nvCxnSpPr>
+          <p:cNvPr id="19" name="Straight Arrow Connector 18"/>
+          <p:cNvCxnSpPr>
+            <a:stCxn id="44" idx="0"/>
+            <a:endCxn id="17" idx="2"/>
+          </p:cNvCxnSpPr>
+          <p:nvPr/>
+        </p:nvCxnSpPr>
+        <p:spPr>
+          <a:xfrm flipV="1">
+            <a:off x="3368751" y="2385395"/>
+            <a:ext cx="0" cy="970976"/>
+          </a:xfrm>
+          <a:prstGeom prst="straightConnector1">
+            <a:avLst/>
+          </a:prstGeom>
+          <a:ln>
+            <a:solidFill>
+              <a:srgbClr val="000080"/>
+            </a:solidFill>
+            <a:tailEnd type="triangle"/>
+          </a:ln>
+        </p:spPr>
+        <p:style>
+          <a:lnRef idx="1">
+            <a:schemeClr val="accent1"/>
+          </a:lnRef>
+          <a:fillRef idx="0">
+            <a:schemeClr val="accent1"/>
+          </a:fillRef>
+          <a:effectRef idx="0">
+            <a:schemeClr val="accent1"/>
+          </a:effectRef>
+          <a:fontRef idx="minor">
+            <a:schemeClr val="tx1"/>
+          </a:fontRef>
+        </p:style>
+      </p:cxnSp>
+      <p:sp>
+        <p:nvSpPr>
+          <p:cNvPr id="20" name="TextBox 19"/>
+          <p:cNvSpPr txBox="1"/>
+          <p:nvPr/>
+        </p:nvSpPr>
+        <p:spPr>
+          <a:xfrm>
+            <a:off x="2903880" y="2524690"/>
+            <a:ext cx="929743" cy="155877"/>
+          </a:xfrm>
+          <a:prstGeom prst="rect">
+            <a:avLst/>
+          </a:prstGeom>
+          <a:solidFill>
+            <a:srgbClr val="F1F1F2"/>
+          </a:solidFill>
+        </p:spPr>
+        <p:txBody>
+          <a:bodyPr wrap="none" lIns="0" tIns="0" rIns="0" bIns="0" rtlCol="0">
+            <a:spAutoFit/>
+          </a:bodyPr>
+          <a:lstStyle/>
+          <a:p>
+            <a:pPr algn="ctr"/>
+            <a:r>
+              <a:rPr lang="en-US" sz="1013">
+                <a:latin typeface="Helvetica" charset="0"/>
+                <a:ea typeface="Helvetica" charset="0"/>
+                <a:cs typeface="Helvetica" charset="0"/>
+              </a:rPr>
+              <a:t>rdfs:subClassOf</a:t>
             </a:r>
           </a:p>
         </p:txBody>

</xml_diff>